<commit_message>
Added radios to the preliminary System Architecture
</commit_message>
<xml_diff>
--- a/Electrical Design/System.pptx
+++ b/Electrical Design/System.pptx
@@ -5534,7 +5534,7 @@
         </p:nvSpPr>
         <p:spPr>
           <a:xfrm>
-            <a:off x="4360806" y="4104916"/>
+            <a:off x="4358375" y="4101674"/>
             <a:ext cx="105406" cy="105406"/>
           </a:xfrm>
           <a:prstGeom prst="ellipse">
@@ -7300,71 +7300,406 @@
           </a:p>
         </p:txBody>
       </p:sp>
-      <p:sp>
-        <p:nvSpPr>
-          <p:cNvPr id="298" name="TextBox 297">
-            <a:extLst>
-              <a:ext uri="{FF2B5EF4-FFF2-40B4-BE49-F238E27FC236}">
-                <a16:creationId xmlns:a16="http://schemas.microsoft.com/office/drawing/2014/main" id="{8D86C882-7256-460A-A907-74A7952AAF34}"/>
-              </a:ext>
-            </a:extLst>
-          </p:cNvPr>
-          <p:cNvSpPr txBox="1"/>
-          <p:nvPr/>
-        </p:nvSpPr>
-        <p:spPr>
+      <p:grpSp>
+        <p:nvGrpSpPr>
+          <p:cNvPr id="307" name="Group 306">
+            <a:extLst>
+              <a:ext uri="{FF2B5EF4-FFF2-40B4-BE49-F238E27FC236}">
+                <a16:creationId xmlns:a16="http://schemas.microsoft.com/office/drawing/2014/main" id="{97A0FACF-40C2-45BD-AE5E-1CFFF4EB8AC2}"/>
+              </a:ext>
+            </a:extLst>
+          </p:cNvPr>
+          <p:cNvGrpSpPr/>
+          <p:nvPr/>
+        </p:nvGrpSpPr>
+        <p:grpSpPr>
           <a:xfrm>
-            <a:off x="2259371" y="5094513"/>
-            <a:ext cx="2704115" cy="1249680"/>
+            <a:off x="8480973" y="246403"/>
+            <a:ext cx="1727621" cy="1249680"/>
+            <a:chOff x="2259371" y="5094513"/>
+            <a:chExt cx="1727621" cy="1249680"/>
+          </a:xfrm>
+        </p:grpSpPr>
+        <p:sp>
+          <p:nvSpPr>
+            <p:cNvPr id="298" name="TextBox 297">
+              <a:extLst>
+                <a:ext uri="{FF2B5EF4-FFF2-40B4-BE49-F238E27FC236}">
+                  <a16:creationId xmlns:a16="http://schemas.microsoft.com/office/drawing/2014/main" id="{8D86C882-7256-460A-A907-74A7952AAF34}"/>
+                </a:ext>
+              </a:extLst>
+            </p:cNvPr>
+            <p:cNvSpPr txBox="1"/>
+            <p:nvPr/>
+          </p:nvSpPr>
+          <p:spPr>
+            <a:xfrm>
+              <a:off x="2259371" y="5094513"/>
+              <a:ext cx="1727621" cy="1249680"/>
+            </a:xfrm>
+            <a:prstGeom prst="rect">
+              <a:avLst/>
+            </a:prstGeom>
+            <a:noFill/>
+            <a:ln>
+              <a:solidFill>
+                <a:schemeClr val="tx1"/>
+              </a:solidFill>
+              <a:prstDash val="dash"/>
+            </a:ln>
+          </p:spPr>
+          <p:txBody>
+            <a:bodyPr wrap="square" rtlCol="0">
+              <a:noAutofit/>
+            </a:bodyPr>
+            <a:lstStyle/>
+            <a:p>
+              <a:r>
+                <a:rPr lang="en-US" dirty="0"/>
+                <a:t>Legend:</a:t>
+              </a:r>
+            </a:p>
+            <a:p>
+              <a:r>
+                <a:rPr lang="en-US" dirty="0"/>
+                <a:t>           Power</a:t>
+              </a:r>
+            </a:p>
+            <a:p>
+              <a:r>
+                <a:rPr lang="en-US" dirty="0"/>
+                <a:t>           Signal</a:t>
+              </a:r>
+            </a:p>
+            <a:p>
+              <a:r>
+                <a:rPr lang="en-US" dirty="0"/>
+                <a:t>           Module</a:t>
+              </a:r>
+            </a:p>
+          </p:txBody>
+        </p:sp>
+        <p:cxnSp>
+          <p:nvCxnSpPr>
+            <p:cNvPr id="299" name="Straight Connector 298">
+              <a:extLst>
+                <a:ext uri="{FF2B5EF4-FFF2-40B4-BE49-F238E27FC236}">
+                  <a16:creationId xmlns:a16="http://schemas.microsoft.com/office/drawing/2014/main" id="{0DF7762D-93E4-46E8-92EB-007CA70CA1F7}"/>
+                </a:ext>
+              </a:extLst>
+            </p:cNvPr>
+            <p:cNvCxnSpPr>
+              <a:cxnSpLocks/>
+            </p:cNvCxnSpPr>
+            <p:nvPr/>
+          </p:nvCxnSpPr>
+          <p:spPr>
+            <a:xfrm flipV="1">
+              <a:off x="2387589" y="5507876"/>
+              <a:ext cx="441487" cy="1150"/>
+            </a:xfrm>
+            <a:prstGeom prst="line">
+              <a:avLst/>
+            </a:prstGeom>
+            <a:ln w="38100" cap="rnd">
+              <a:solidFill>
+                <a:srgbClr val="FF0000"/>
+              </a:solidFill>
+            </a:ln>
+          </p:spPr>
+          <p:style>
+            <a:lnRef idx="1">
+              <a:schemeClr val="accent1"/>
+            </a:lnRef>
+            <a:fillRef idx="0">
+              <a:schemeClr val="accent1"/>
+            </a:fillRef>
+            <a:effectRef idx="0">
+              <a:schemeClr val="accent1"/>
+            </a:effectRef>
+            <a:fontRef idx="minor">
+              <a:schemeClr val="tx1"/>
+            </a:fontRef>
+          </p:style>
+        </p:cxnSp>
+        <p:cxnSp>
+          <p:nvCxnSpPr>
+            <p:cNvPr id="300" name="Straight Connector 299">
+              <a:extLst>
+                <a:ext uri="{FF2B5EF4-FFF2-40B4-BE49-F238E27FC236}">
+                  <a16:creationId xmlns:a16="http://schemas.microsoft.com/office/drawing/2014/main" id="{7C062950-86DD-437A-9EC6-BDE6A725E84C}"/>
+                </a:ext>
+              </a:extLst>
+            </p:cNvPr>
+            <p:cNvCxnSpPr>
+              <a:cxnSpLocks/>
+            </p:cNvCxnSpPr>
+            <p:nvPr/>
+          </p:nvCxnSpPr>
+          <p:spPr>
+            <a:xfrm>
+              <a:off x="2387589" y="5596164"/>
+              <a:ext cx="441487" cy="0"/>
+            </a:xfrm>
+            <a:prstGeom prst="line">
+              <a:avLst/>
+            </a:prstGeom>
+            <a:ln w="38100" cap="rnd">
+              <a:solidFill>
+                <a:schemeClr val="tx1"/>
+              </a:solidFill>
+            </a:ln>
+          </p:spPr>
+          <p:style>
+            <a:lnRef idx="1">
+              <a:schemeClr val="accent1"/>
+            </a:lnRef>
+            <a:fillRef idx="0">
+              <a:schemeClr val="accent1"/>
+            </a:fillRef>
+            <a:effectRef idx="0">
+              <a:schemeClr val="accent1"/>
+            </a:effectRef>
+            <a:fontRef idx="minor">
+              <a:schemeClr val="tx1"/>
+            </a:fontRef>
+          </p:style>
+        </p:cxnSp>
+        <p:cxnSp>
+          <p:nvCxnSpPr>
+            <p:cNvPr id="302" name="Straight Connector 301">
+              <a:extLst>
+                <a:ext uri="{FF2B5EF4-FFF2-40B4-BE49-F238E27FC236}">
+                  <a16:creationId xmlns:a16="http://schemas.microsoft.com/office/drawing/2014/main" id="{B59A06D9-E7C3-4CE0-9C01-A2098EBDDC67}"/>
+                </a:ext>
+              </a:extLst>
+            </p:cNvPr>
+            <p:cNvCxnSpPr>
+              <a:cxnSpLocks/>
+            </p:cNvCxnSpPr>
+            <p:nvPr/>
+          </p:nvCxnSpPr>
+          <p:spPr>
+            <a:xfrm>
+              <a:off x="2387589" y="5827718"/>
+              <a:ext cx="441487" cy="0"/>
+            </a:xfrm>
+            <a:prstGeom prst="line">
+              <a:avLst/>
+            </a:prstGeom>
+            <a:ln w="19050" cap="rnd"/>
+          </p:spPr>
+          <p:style>
+            <a:lnRef idx="1">
+              <a:schemeClr val="accent1"/>
+            </a:lnRef>
+            <a:fillRef idx="0">
+              <a:schemeClr val="accent1"/>
+            </a:fillRef>
+            <a:effectRef idx="0">
+              <a:schemeClr val="accent1"/>
+            </a:effectRef>
+            <a:fontRef idx="minor">
+              <a:schemeClr val="tx1"/>
+            </a:fontRef>
+          </p:style>
+        </p:cxnSp>
+        <p:sp>
+          <p:nvSpPr>
+            <p:cNvPr id="304" name="Rectangle 303">
+              <a:extLst>
+                <a:ext uri="{FF2B5EF4-FFF2-40B4-BE49-F238E27FC236}">
+                  <a16:creationId xmlns:a16="http://schemas.microsoft.com/office/drawing/2014/main" id="{1A9F1BD1-EF3A-44FF-8F2F-B1EBC082E95B}"/>
+                </a:ext>
+              </a:extLst>
+            </p:cNvPr>
+            <p:cNvSpPr/>
+            <p:nvPr/>
+          </p:nvSpPr>
+          <p:spPr>
+            <a:xfrm>
+              <a:off x="2651276" y="6009756"/>
+              <a:ext cx="177800" cy="177800"/>
+            </a:xfrm>
+            <a:prstGeom prst="rect">
+              <a:avLst/>
+            </a:prstGeom>
+          </p:spPr>
+          <p:style>
+            <a:lnRef idx="2">
+              <a:schemeClr val="accent1">
+                <a:shade val="50000"/>
+              </a:schemeClr>
+            </a:lnRef>
+            <a:fillRef idx="1">
+              <a:schemeClr val="accent1"/>
+            </a:fillRef>
+            <a:effectRef idx="0">
+              <a:schemeClr val="accent1"/>
+            </a:effectRef>
+            <a:fontRef idx="minor">
+              <a:schemeClr val="lt1"/>
+            </a:fontRef>
+          </p:style>
+          <p:txBody>
+            <a:bodyPr rtlCol="0" anchor="ctr"/>
+            <a:lstStyle/>
+            <a:p>
+              <a:pPr algn="ctr"/>
+              <a:endParaRPr lang="en-US"/>
+            </a:p>
+          </p:txBody>
+        </p:sp>
+      </p:grpSp>
+      <p:sp>
+        <p:nvSpPr>
+          <p:cNvPr id="308" name="Rectangle 307">
+            <a:extLst>
+              <a:ext uri="{FF2B5EF4-FFF2-40B4-BE49-F238E27FC236}">
+                <a16:creationId xmlns:a16="http://schemas.microsoft.com/office/drawing/2014/main" id="{3F34487E-1590-4797-9A40-F0315FF7B287}"/>
+              </a:ext>
+            </a:extLst>
+          </p:cNvPr>
+          <p:cNvSpPr/>
+          <p:nvPr/>
+        </p:nvSpPr>
+        <p:spPr>
+          <a:xfrm>
+            <a:off x="2196436" y="4898956"/>
+            <a:ext cx="2744841" cy="914400"/>
           </a:xfrm>
           <a:prstGeom prst="rect">
             <a:avLst/>
           </a:prstGeom>
-          <a:noFill/>
-          <a:ln>
+        </p:spPr>
+        <p:style>
+          <a:lnRef idx="2">
+            <a:schemeClr val="accent1">
+              <a:shade val="50000"/>
+            </a:schemeClr>
+          </a:lnRef>
+          <a:fillRef idx="1">
+            <a:schemeClr val="accent1"/>
+          </a:fillRef>
+          <a:effectRef idx="0">
+            <a:schemeClr val="accent1"/>
+          </a:effectRef>
+          <a:fontRef idx="minor">
+            <a:schemeClr val="lt1"/>
+          </a:fontRef>
+        </p:style>
+        <p:txBody>
+          <a:bodyPr rtlCol="0" anchor="ctr"/>
+          <a:lstStyle/>
+          <a:p>
+            <a:pPr algn="ctr"/>
+            <a:r>
+              <a:rPr lang="en-US" dirty="0"/>
+              <a:t>Communications</a:t>
+            </a:r>
+          </a:p>
+          <a:p>
+            <a:pPr algn="ctr"/>
+            <a:r>
+              <a:rPr lang="en-US" dirty="0"/>
+              <a:t>(radios)</a:t>
+            </a:r>
+          </a:p>
+        </p:txBody>
+      </p:sp>
+      <p:cxnSp>
+        <p:nvCxnSpPr>
+          <p:cNvPr id="310" name="Connector: Elbow 309">
+            <a:extLst>
+              <a:ext uri="{FF2B5EF4-FFF2-40B4-BE49-F238E27FC236}">
+                <a16:creationId xmlns:a16="http://schemas.microsoft.com/office/drawing/2014/main" id="{F93FFA4F-29B9-4F94-9C5C-E874C818DFFC}"/>
+              </a:ext>
+            </a:extLst>
+          </p:cNvPr>
+          <p:cNvCxnSpPr>
+            <a:stCxn id="115" idx="2"/>
+            <a:endCxn id="308" idx="0"/>
+          </p:cNvCxnSpPr>
+          <p:nvPr/>
+        </p:nvCxnSpPr>
+        <p:spPr>
+          <a:xfrm rot="5400000">
+            <a:off x="4327954" y="3130909"/>
+            <a:ext cx="1008951" cy="2527143"/>
+          </a:xfrm>
+          <a:prstGeom prst="bentConnector3">
+            <a:avLst>
+              <a:gd name="adj1" fmla="val 55754"/>
+            </a:avLst>
+          </a:prstGeom>
+          <a:ln w="19050">
+            <a:tailEnd type="triangle"/>
+          </a:ln>
+        </p:spPr>
+        <p:style>
+          <a:lnRef idx="1">
+            <a:schemeClr val="accent1"/>
+          </a:lnRef>
+          <a:fillRef idx="0">
+            <a:schemeClr val="accent1"/>
+          </a:fillRef>
+          <a:effectRef idx="0">
+            <a:schemeClr val="accent1"/>
+          </a:effectRef>
+          <a:fontRef idx="minor">
+            <a:schemeClr val="tx1"/>
+          </a:fontRef>
+        </p:style>
+      </p:cxnSp>
+      <p:cxnSp>
+        <p:nvCxnSpPr>
+          <p:cNvPr id="312" name="Straight Connector 311">
+            <a:extLst>
+              <a:ext uri="{FF2B5EF4-FFF2-40B4-BE49-F238E27FC236}">
+                <a16:creationId xmlns:a16="http://schemas.microsoft.com/office/drawing/2014/main" id="{FBE0FF93-6773-4F9F-9157-5D177BA15CC3}"/>
+              </a:ext>
+            </a:extLst>
+          </p:cNvPr>
+          <p:cNvCxnSpPr>
+            <a:cxnSpLocks/>
+          </p:cNvCxnSpPr>
+          <p:nvPr/>
+        </p:nvCxnSpPr>
+        <p:spPr>
+          <a:xfrm>
+            <a:off x="4609468" y="4286641"/>
+            <a:ext cx="0" cy="612315"/>
+          </a:xfrm>
+          <a:prstGeom prst="line">
+            <a:avLst/>
+          </a:prstGeom>
+          <a:ln w="38100" cap="rnd">
             <a:solidFill>
               <a:schemeClr val="tx1"/>
             </a:solidFill>
-            <a:prstDash val="dash"/>
           </a:ln>
         </p:spPr>
-        <p:txBody>
-          <a:bodyPr wrap="square" rtlCol="0">
-            <a:noAutofit/>
-          </a:bodyPr>
-          <a:lstStyle/>
-          <a:p>
-            <a:r>
-              <a:rPr lang="en-US" dirty="0"/>
-              <a:t>Legend:</a:t>
-            </a:r>
-          </a:p>
-          <a:p>
-            <a:r>
-              <a:rPr lang="en-US" dirty="0"/>
-              <a:t>           Power</a:t>
-            </a:r>
-          </a:p>
-          <a:p>
-            <a:r>
-              <a:rPr lang="en-US" dirty="0"/>
-              <a:t>           Signal</a:t>
-            </a:r>
-          </a:p>
-          <a:p>
-            <a:r>
-              <a:rPr lang="en-US" dirty="0"/>
-              <a:t>           Module</a:t>
-            </a:r>
-          </a:p>
-        </p:txBody>
-      </p:sp>
+        <p:style>
+          <a:lnRef idx="1">
+            <a:schemeClr val="accent1"/>
+          </a:lnRef>
+          <a:fillRef idx="0">
+            <a:schemeClr val="accent1"/>
+          </a:fillRef>
+          <a:effectRef idx="0">
+            <a:schemeClr val="accent1"/>
+          </a:effectRef>
+          <a:fontRef idx="minor">
+            <a:schemeClr val="tx1"/>
+          </a:fontRef>
+        </p:style>
+      </p:cxnSp>
       <p:cxnSp>
         <p:nvCxnSpPr>
-          <p:cNvPr id="299" name="Straight Connector 298">
-            <a:extLst>
-              <a:ext uri="{FF2B5EF4-FFF2-40B4-BE49-F238E27FC236}">
-                <a16:creationId xmlns:a16="http://schemas.microsoft.com/office/drawing/2014/main" id="{0DF7762D-93E4-46E8-92EB-007CA70CA1F7}"/>
+          <p:cNvPr id="313" name="Straight Connector 312">
+            <a:extLst>
+              <a:ext uri="{FF2B5EF4-FFF2-40B4-BE49-F238E27FC236}">
+                <a16:creationId xmlns:a16="http://schemas.microsoft.com/office/drawing/2014/main" id="{6EDF0F38-BBEF-4319-8384-2B93F09AFDC5}"/>
               </a:ext>
             </a:extLst>
           </p:cNvPr>
@@ -7375,8 +7710,8 @@
         </p:nvCxnSpPr>
         <p:spPr>
           <a:xfrm flipV="1">
-            <a:off x="2387589" y="5507876"/>
-            <a:ext cx="441487" cy="1150"/>
+            <a:off x="4413507" y="4152980"/>
+            <a:ext cx="0" cy="745976"/>
           </a:xfrm>
           <a:prstGeom prst="line">
             <a:avLst/>
@@ -7402,134 +7737,6 @@
           </a:fontRef>
         </p:style>
       </p:cxnSp>
-      <p:cxnSp>
-        <p:nvCxnSpPr>
-          <p:cNvPr id="300" name="Straight Connector 299">
-            <a:extLst>
-              <a:ext uri="{FF2B5EF4-FFF2-40B4-BE49-F238E27FC236}">
-                <a16:creationId xmlns:a16="http://schemas.microsoft.com/office/drawing/2014/main" id="{7C062950-86DD-437A-9EC6-BDE6A725E84C}"/>
-              </a:ext>
-            </a:extLst>
-          </p:cNvPr>
-          <p:cNvCxnSpPr>
-            <a:cxnSpLocks/>
-          </p:cNvCxnSpPr>
-          <p:nvPr/>
-        </p:nvCxnSpPr>
-        <p:spPr>
-          <a:xfrm>
-            <a:off x="2387589" y="5596164"/>
-            <a:ext cx="441487" cy="0"/>
-          </a:xfrm>
-          <a:prstGeom prst="line">
-            <a:avLst/>
-          </a:prstGeom>
-          <a:ln w="38100" cap="rnd">
-            <a:solidFill>
-              <a:schemeClr val="tx1"/>
-            </a:solidFill>
-          </a:ln>
-        </p:spPr>
-        <p:style>
-          <a:lnRef idx="1">
-            <a:schemeClr val="accent1"/>
-          </a:lnRef>
-          <a:fillRef idx="0">
-            <a:schemeClr val="accent1"/>
-          </a:fillRef>
-          <a:effectRef idx="0">
-            <a:schemeClr val="accent1"/>
-          </a:effectRef>
-          <a:fontRef idx="minor">
-            <a:schemeClr val="tx1"/>
-          </a:fontRef>
-        </p:style>
-      </p:cxnSp>
-      <p:cxnSp>
-        <p:nvCxnSpPr>
-          <p:cNvPr id="302" name="Straight Connector 301">
-            <a:extLst>
-              <a:ext uri="{FF2B5EF4-FFF2-40B4-BE49-F238E27FC236}">
-                <a16:creationId xmlns:a16="http://schemas.microsoft.com/office/drawing/2014/main" id="{B59A06D9-E7C3-4CE0-9C01-A2098EBDDC67}"/>
-              </a:ext>
-            </a:extLst>
-          </p:cNvPr>
-          <p:cNvCxnSpPr>
-            <a:cxnSpLocks/>
-          </p:cNvCxnSpPr>
-          <p:nvPr/>
-        </p:nvCxnSpPr>
-        <p:spPr>
-          <a:xfrm>
-            <a:off x="2387589" y="5827718"/>
-            <a:ext cx="441487" cy="0"/>
-          </a:xfrm>
-          <a:prstGeom prst="line">
-            <a:avLst/>
-          </a:prstGeom>
-          <a:ln w="19050" cap="rnd"/>
-        </p:spPr>
-        <p:style>
-          <a:lnRef idx="1">
-            <a:schemeClr val="accent1"/>
-          </a:lnRef>
-          <a:fillRef idx="0">
-            <a:schemeClr val="accent1"/>
-          </a:fillRef>
-          <a:effectRef idx="0">
-            <a:schemeClr val="accent1"/>
-          </a:effectRef>
-          <a:fontRef idx="minor">
-            <a:schemeClr val="tx1"/>
-          </a:fontRef>
-        </p:style>
-      </p:cxnSp>
-      <p:sp>
-        <p:nvSpPr>
-          <p:cNvPr id="304" name="Rectangle 303">
-            <a:extLst>
-              <a:ext uri="{FF2B5EF4-FFF2-40B4-BE49-F238E27FC236}">
-                <a16:creationId xmlns:a16="http://schemas.microsoft.com/office/drawing/2014/main" id="{1A9F1BD1-EF3A-44FF-8F2F-B1EBC082E95B}"/>
-              </a:ext>
-            </a:extLst>
-          </p:cNvPr>
-          <p:cNvSpPr/>
-          <p:nvPr/>
-        </p:nvSpPr>
-        <p:spPr>
-          <a:xfrm>
-            <a:off x="2651276" y="6009756"/>
-            <a:ext cx="177800" cy="177800"/>
-          </a:xfrm>
-          <a:prstGeom prst="rect">
-            <a:avLst/>
-          </a:prstGeom>
-        </p:spPr>
-        <p:style>
-          <a:lnRef idx="2">
-            <a:schemeClr val="accent1">
-              <a:shade val="50000"/>
-            </a:schemeClr>
-          </a:lnRef>
-          <a:fillRef idx="1">
-            <a:schemeClr val="accent1"/>
-          </a:fillRef>
-          <a:effectRef idx="0">
-            <a:schemeClr val="accent1"/>
-          </a:effectRef>
-          <a:fontRef idx="minor">
-            <a:schemeClr val="lt1"/>
-          </a:fontRef>
-        </p:style>
-        <p:txBody>
-          <a:bodyPr rtlCol="0" anchor="ctr"/>
-          <a:lstStyle/>
-          <a:p>
-            <a:pPr algn="ctr"/>
-            <a:endParaRPr lang="en-US"/>
-          </a:p>
-        </p:txBody>
-      </p:sp>
     </p:spTree>
     <p:extLst>
       <p:ext uri="{BB962C8B-B14F-4D97-AF65-F5344CB8AC3E}">

</xml_diff>